<commit_message>
draft of new ui and combined camera
</commit_message>
<xml_diff>
--- a/doc/manip.pptx
+++ b/doc/manip.pptx
@@ -8,6 +8,9 @@
     <p:sldId id="256" r:id="rId2"/>
     <p:sldId id="257" r:id="rId3"/>
     <p:sldId id="258" r:id="rId4"/>
+    <p:sldId id="259" r:id="rId5"/>
+    <p:sldId id="260" r:id="rId6"/>
+    <p:sldId id="261" r:id="rId7"/>
   </p:sldIdLst>
   <p:sldSz cx="12192000" cy="6858000"/>
   <p:notesSz cx="6858000" cy="9144000"/>
@@ -156,10 +159,9 @@
           </a:lstStyle>
           <a:p>
             <a:r>
-              <a:rPr lang="zh-TW" altLang="en-US" smtClean="0"/>
+              <a:rPr lang="zh-TW" altLang="en-US"/>
               <a:t>按一下以編輯母片標題樣式</a:t>
             </a:r>
-            <a:endParaRPr lang="zh-TW" altLang="en-US"/>
           </a:p>
         </p:txBody>
       </p:sp>
@@ -221,10 +223,9 @@
           </a:lstStyle>
           <a:p>
             <a:r>
-              <a:rPr lang="zh-TW" altLang="en-US" smtClean="0"/>
+              <a:rPr lang="zh-TW" altLang="en-US"/>
               <a:t>按一下以編輯母片副標題樣式</a:t>
             </a:r>
-            <a:endParaRPr lang="zh-TW" altLang="en-US"/>
           </a:p>
         </p:txBody>
       </p:sp>
@@ -245,7 +246,7 @@
           <a:p>
             <a:fld id="{2C22BB58-A988-46AB-A05B-B9BF694460D0}" type="datetimeFigureOut">
               <a:rPr lang="zh-TW" altLang="en-US" smtClean="0"/>
-              <a:t>2021/8/19</a:t>
+              <a:t>2021/12/18</a:t>
             </a:fld>
             <a:endParaRPr lang="zh-TW" altLang="en-US"/>
           </a:p>
@@ -339,10 +340,9 @@
           <a:lstStyle/>
           <a:p>
             <a:r>
-              <a:rPr lang="zh-TW" altLang="en-US" smtClean="0"/>
+              <a:rPr lang="zh-TW" altLang="en-US"/>
               <a:t>按一下以編輯母片標題樣式</a:t>
             </a:r>
-            <a:endParaRPr lang="zh-TW" altLang="en-US"/>
           </a:p>
         </p:txBody>
       </p:sp>
@@ -363,38 +363,37 @@
           <a:p>
             <a:pPr lvl="0"/>
             <a:r>
-              <a:rPr lang="zh-TW" altLang="en-US" smtClean="0"/>
+              <a:rPr lang="zh-TW" altLang="en-US"/>
               <a:t>編輯母片文字樣式</a:t>
             </a:r>
           </a:p>
           <a:p>
             <a:pPr lvl="1"/>
             <a:r>
-              <a:rPr lang="zh-TW" altLang="en-US" smtClean="0"/>
+              <a:rPr lang="zh-TW" altLang="en-US"/>
               <a:t>第二層</a:t>
             </a:r>
           </a:p>
           <a:p>
             <a:pPr lvl="2"/>
             <a:r>
-              <a:rPr lang="zh-TW" altLang="en-US" smtClean="0"/>
+              <a:rPr lang="zh-TW" altLang="en-US"/>
               <a:t>第三層</a:t>
             </a:r>
           </a:p>
           <a:p>
             <a:pPr lvl="3"/>
             <a:r>
-              <a:rPr lang="zh-TW" altLang="en-US" smtClean="0"/>
+              <a:rPr lang="zh-TW" altLang="en-US"/>
               <a:t>第四層</a:t>
             </a:r>
           </a:p>
           <a:p>
             <a:pPr lvl="4"/>
             <a:r>
-              <a:rPr lang="zh-TW" altLang="en-US" smtClean="0"/>
+              <a:rPr lang="zh-TW" altLang="en-US"/>
               <a:t>第五層</a:t>
             </a:r>
-            <a:endParaRPr lang="zh-TW" altLang="en-US"/>
           </a:p>
         </p:txBody>
       </p:sp>
@@ -415,7 +414,7 @@
           <a:p>
             <a:fld id="{2C22BB58-A988-46AB-A05B-B9BF694460D0}" type="datetimeFigureOut">
               <a:rPr lang="zh-TW" altLang="en-US" smtClean="0"/>
-              <a:t>2021/8/19</a:t>
+              <a:t>2021/12/18</a:t>
             </a:fld>
             <a:endParaRPr lang="zh-TW" altLang="en-US"/>
           </a:p>
@@ -514,10 +513,9 @@
           <a:lstStyle/>
           <a:p>
             <a:r>
-              <a:rPr lang="zh-TW" altLang="en-US" smtClean="0"/>
+              <a:rPr lang="zh-TW" altLang="en-US"/>
               <a:t>按一下以編輯母片標題樣式</a:t>
             </a:r>
-            <a:endParaRPr lang="zh-TW" altLang="en-US"/>
           </a:p>
         </p:txBody>
       </p:sp>
@@ -543,38 +541,37 @@
           <a:p>
             <a:pPr lvl="0"/>
             <a:r>
-              <a:rPr lang="zh-TW" altLang="en-US" smtClean="0"/>
+              <a:rPr lang="zh-TW" altLang="en-US"/>
               <a:t>編輯母片文字樣式</a:t>
             </a:r>
           </a:p>
           <a:p>
             <a:pPr lvl="1"/>
             <a:r>
-              <a:rPr lang="zh-TW" altLang="en-US" smtClean="0"/>
+              <a:rPr lang="zh-TW" altLang="en-US"/>
               <a:t>第二層</a:t>
             </a:r>
           </a:p>
           <a:p>
             <a:pPr lvl="2"/>
             <a:r>
-              <a:rPr lang="zh-TW" altLang="en-US" smtClean="0"/>
+              <a:rPr lang="zh-TW" altLang="en-US"/>
               <a:t>第三層</a:t>
             </a:r>
           </a:p>
           <a:p>
             <a:pPr lvl="3"/>
             <a:r>
-              <a:rPr lang="zh-TW" altLang="en-US" smtClean="0"/>
+              <a:rPr lang="zh-TW" altLang="en-US"/>
               <a:t>第四層</a:t>
             </a:r>
           </a:p>
           <a:p>
             <a:pPr lvl="4"/>
             <a:r>
-              <a:rPr lang="zh-TW" altLang="en-US" smtClean="0"/>
+              <a:rPr lang="zh-TW" altLang="en-US"/>
               <a:t>第五層</a:t>
             </a:r>
-            <a:endParaRPr lang="zh-TW" altLang="en-US"/>
           </a:p>
         </p:txBody>
       </p:sp>
@@ -595,7 +592,7 @@
           <a:p>
             <a:fld id="{2C22BB58-A988-46AB-A05B-B9BF694460D0}" type="datetimeFigureOut">
               <a:rPr lang="zh-TW" altLang="en-US" smtClean="0"/>
-              <a:t>2021/8/19</a:t>
+              <a:t>2021/12/18</a:t>
             </a:fld>
             <a:endParaRPr lang="zh-TW" altLang="en-US"/>
           </a:p>
@@ -689,10 +686,9 @@
           <a:lstStyle/>
           <a:p>
             <a:r>
-              <a:rPr lang="zh-TW" altLang="en-US" smtClean="0"/>
+              <a:rPr lang="zh-TW" altLang="en-US"/>
               <a:t>按一下以編輯母片標題樣式</a:t>
             </a:r>
-            <a:endParaRPr lang="zh-TW" altLang="en-US"/>
           </a:p>
         </p:txBody>
       </p:sp>
@@ -713,38 +709,37 @@
           <a:p>
             <a:pPr lvl="0"/>
             <a:r>
-              <a:rPr lang="zh-TW" altLang="en-US" smtClean="0"/>
+              <a:rPr lang="zh-TW" altLang="en-US"/>
               <a:t>編輯母片文字樣式</a:t>
             </a:r>
           </a:p>
           <a:p>
             <a:pPr lvl="1"/>
             <a:r>
-              <a:rPr lang="zh-TW" altLang="en-US" smtClean="0"/>
+              <a:rPr lang="zh-TW" altLang="en-US"/>
               <a:t>第二層</a:t>
             </a:r>
           </a:p>
           <a:p>
             <a:pPr lvl="2"/>
             <a:r>
-              <a:rPr lang="zh-TW" altLang="en-US" smtClean="0"/>
+              <a:rPr lang="zh-TW" altLang="en-US"/>
               <a:t>第三層</a:t>
             </a:r>
           </a:p>
           <a:p>
             <a:pPr lvl="3"/>
             <a:r>
-              <a:rPr lang="zh-TW" altLang="en-US" smtClean="0"/>
+              <a:rPr lang="zh-TW" altLang="en-US"/>
               <a:t>第四層</a:t>
             </a:r>
           </a:p>
           <a:p>
             <a:pPr lvl="4"/>
             <a:r>
-              <a:rPr lang="zh-TW" altLang="en-US" smtClean="0"/>
+              <a:rPr lang="zh-TW" altLang="en-US"/>
               <a:t>第五層</a:t>
             </a:r>
-            <a:endParaRPr lang="zh-TW" altLang="en-US"/>
           </a:p>
         </p:txBody>
       </p:sp>
@@ -765,7 +760,7 @@
           <a:p>
             <a:fld id="{2C22BB58-A988-46AB-A05B-B9BF694460D0}" type="datetimeFigureOut">
               <a:rPr lang="zh-TW" altLang="en-US" smtClean="0"/>
-              <a:t>2021/8/19</a:t>
+              <a:t>2021/12/18</a:t>
             </a:fld>
             <a:endParaRPr lang="zh-TW" altLang="en-US"/>
           </a:p>
@@ -868,10 +863,9 @@
           </a:lstStyle>
           <a:p>
             <a:r>
-              <a:rPr lang="zh-TW" altLang="en-US" smtClean="0"/>
+              <a:rPr lang="zh-TW" altLang="en-US"/>
               <a:t>按一下以編輯母片標題樣式</a:t>
             </a:r>
-            <a:endParaRPr lang="zh-TW" altLang="en-US"/>
           </a:p>
         </p:txBody>
       </p:sp>
@@ -988,7 +982,7 @@
           <a:p>
             <a:pPr lvl="0"/>
             <a:r>
-              <a:rPr lang="zh-TW" altLang="en-US" smtClean="0"/>
+              <a:rPr lang="zh-TW" altLang="en-US"/>
               <a:t>編輯母片文字樣式</a:t>
             </a:r>
           </a:p>
@@ -1011,7 +1005,7 @@
           <a:p>
             <a:fld id="{2C22BB58-A988-46AB-A05B-B9BF694460D0}" type="datetimeFigureOut">
               <a:rPr lang="zh-TW" altLang="en-US" smtClean="0"/>
-              <a:t>2021/8/19</a:t>
+              <a:t>2021/12/18</a:t>
             </a:fld>
             <a:endParaRPr lang="zh-TW" altLang="en-US"/>
           </a:p>
@@ -1105,10 +1099,9 @@
           <a:lstStyle/>
           <a:p>
             <a:r>
-              <a:rPr lang="zh-TW" altLang="en-US" smtClean="0"/>
+              <a:rPr lang="zh-TW" altLang="en-US"/>
               <a:t>按一下以編輯母片標題樣式</a:t>
             </a:r>
-            <a:endParaRPr lang="zh-TW" altLang="en-US"/>
           </a:p>
         </p:txBody>
       </p:sp>
@@ -1134,38 +1127,37 @@
           <a:p>
             <a:pPr lvl="0"/>
             <a:r>
-              <a:rPr lang="zh-TW" altLang="en-US" smtClean="0"/>
+              <a:rPr lang="zh-TW" altLang="en-US"/>
               <a:t>編輯母片文字樣式</a:t>
             </a:r>
           </a:p>
           <a:p>
             <a:pPr lvl="1"/>
             <a:r>
-              <a:rPr lang="zh-TW" altLang="en-US" smtClean="0"/>
+              <a:rPr lang="zh-TW" altLang="en-US"/>
               <a:t>第二層</a:t>
             </a:r>
           </a:p>
           <a:p>
             <a:pPr lvl="2"/>
             <a:r>
-              <a:rPr lang="zh-TW" altLang="en-US" smtClean="0"/>
+              <a:rPr lang="zh-TW" altLang="en-US"/>
               <a:t>第三層</a:t>
             </a:r>
           </a:p>
           <a:p>
             <a:pPr lvl="3"/>
             <a:r>
-              <a:rPr lang="zh-TW" altLang="en-US" smtClean="0"/>
+              <a:rPr lang="zh-TW" altLang="en-US"/>
               <a:t>第四層</a:t>
             </a:r>
           </a:p>
           <a:p>
             <a:pPr lvl="4"/>
             <a:r>
-              <a:rPr lang="zh-TW" altLang="en-US" smtClean="0"/>
+              <a:rPr lang="zh-TW" altLang="en-US"/>
               <a:t>第五層</a:t>
             </a:r>
-            <a:endParaRPr lang="zh-TW" altLang="en-US"/>
           </a:p>
         </p:txBody>
       </p:sp>
@@ -1191,38 +1183,37 @@
           <a:p>
             <a:pPr lvl="0"/>
             <a:r>
-              <a:rPr lang="zh-TW" altLang="en-US" smtClean="0"/>
+              <a:rPr lang="zh-TW" altLang="en-US"/>
               <a:t>編輯母片文字樣式</a:t>
             </a:r>
           </a:p>
           <a:p>
             <a:pPr lvl="1"/>
             <a:r>
-              <a:rPr lang="zh-TW" altLang="en-US" smtClean="0"/>
+              <a:rPr lang="zh-TW" altLang="en-US"/>
               <a:t>第二層</a:t>
             </a:r>
           </a:p>
           <a:p>
             <a:pPr lvl="2"/>
             <a:r>
-              <a:rPr lang="zh-TW" altLang="en-US" smtClean="0"/>
+              <a:rPr lang="zh-TW" altLang="en-US"/>
               <a:t>第三層</a:t>
             </a:r>
           </a:p>
           <a:p>
             <a:pPr lvl="3"/>
             <a:r>
-              <a:rPr lang="zh-TW" altLang="en-US" smtClean="0"/>
+              <a:rPr lang="zh-TW" altLang="en-US"/>
               <a:t>第四層</a:t>
             </a:r>
           </a:p>
           <a:p>
             <a:pPr lvl="4"/>
             <a:r>
-              <a:rPr lang="zh-TW" altLang="en-US" smtClean="0"/>
+              <a:rPr lang="zh-TW" altLang="en-US"/>
               <a:t>第五層</a:t>
             </a:r>
-            <a:endParaRPr lang="zh-TW" altLang="en-US"/>
           </a:p>
         </p:txBody>
       </p:sp>
@@ -1243,7 +1234,7 @@
           <a:p>
             <a:fld id="{2C22BB58-A988-46AB-A05B-B9BF694460D0}" type="datetimeFigureOut">
               <a:rPr lang="zh-TW" altLang="en-US" smtClean="0"/>
-              <a:t>2021/8/19</a:t>
+              <a:t>2021/12/18</a:t>
             </a:fld>
             <a:endParaRPr lang="zh-TW" altLang="en-US"/>
           </a:p>
@@ -1342,10 +1333,9 @@
           <a:lstStyle/>
           <a:p>
             <a:r>
-              <a:rPr lang="zh-TW" altLang="en-US" smtClean="0"/>
+              <a:rPr lang="zh-TW" altLang="en-US"/>
               <a:t>按一下以編輯母片標題樣式</a:t>
             </a:r>
-            <a:endParaRPr lang="zh-TW" altLang="en-US"/>
           </a:p>
         </p:txBody>
       </p:sp>
@@ -1408,7 +1398,7 @@
           <a:p>
             <a:pPr lvl="0"/>
             <a:r>
-              <a:rPr lang="zh-TW" altLang="en-US" smtClean="0"/>
+              <a:rPr lang="zh-TW" altLang="en-US"/>
               <a:t>編輯母片文字樣式</a:t>
             </a:r>
           </a:p>
@@ -1436,38 +1426,37 @@
           <a:p>
             <a:pPr lvl="0"/>
             <a:r>
-              <a:rPr lang="zh-TW" altLang="en-US" smtClean="0"/>
+              <a:rPr lang="zh-TW" altLang="en-US"/>
               <a:t>編輯母片文字樣式</a:t>
             </a:r>
           </a:p>
           <a:p>
             <a:pPr lvl="1"/>
             <a:r>
-              <a:rPr lang="zh-TW" altLang="en-US" smtClean="0"/>
+              <a:rPr lang="zh-TW" altLang="en-US"/>
               <a:t>第二層</a:t>
             </a:r>
           </a:p>
           <a:p>
             <a:pPr lvl="2"/>
             <a:r>
-              <a:rPr lang="zh-TW" altLang="en-US" smtClean="0"/>
+              <a:rPr lang="zh-TW" altLang="en-US"/>
               <a:t>第三層</a:t>
             </a:r>
           </a:p>
           <a:p>
             <a:pPr lvl="3"/>
             <a:r>
-              <a:rPr lang="zh-TW" altLang="en-US" smtClean="0"/>
+              <a:rPr lang="zh-TW" altLang="en-US"/>
               <a:t>第四層</a:t>
             </a:r>
           </a:p>
           <a:p>
             <a:pPr lvl="4"/>
             <a:r>
-              <a:rPr lang="zh-TW" altLang="en-US" smtClean="0"/>
+              <a:rPr lang="zh-TW" altLang="en-US"/>
               <a:t>第五層</a:t>
             </a:r>
-            <a:endParaRPr lang="zh-TW" altLang="en-US"/>
           </a:p>
         </p:txBody>
       </p:sp>
@@ -1530,7 +1519,7 @@
           <a:p>
             <a:pPr lvl="0"/>
             <a:r>
-              <a:rPr lang="zh-TW" altLang="en-US" smtClean="0"/>
+              <a:rPr lang="zh-TW" altLang="en-US"/>
               <a:t>編輯母片文字樣式</a:t>
             </a:r>
           </a:p>
@@ -1558,38 +1547,37 @@
           <a:p>
             <a:pPr lvl="0"/>
             <a:r>
-              <a:rPr lang="zh-TW" altLang="en-US" smtClean="0"/>
+              <a:rPr lang="zh-TW" altLang="en-US"/>
               <a:t>編輯母片文字樣式</a:t>
             </a:r>
           </a:p>
           <a:p>
             <a:pPr lvl="1"/>
             <a:r>
-              <a:rPr lang="zh-TW" altLang="en-US" smtClean="0"/>
+              <a:rPr lang="zh-TW" altLang="en-US"/>
               <a:t>第二層</a:t>
             </a:r>
           </a:p>
           <a:p>
             <a:pPr lvl="2"/>
             <a:r>
-              <a:rPr lang="zh-TW" altLang="en-US" smtClean="0"/>
+              <a:rPr lang="zh-TW" altLang="en-US"/>
               <a:t>第三層</a:t>
             </a:r>
           </a:p>
           <a:p>
             <a:pPr lvl="3"/>
             <a:r>
-              <a:rPr lang="zh-TW" altLang="en-US" smtClean="0"/>
+              <a:rPr lang="zh-TW" altLang="en-US"/>
               <a:t>第四層</a:t>
             </a:r>
           </a:p>
           <a:p>
             <a:pPr lvl="4"/>
             <a:r>
-              <a:rPr lang="zh-TW" altLang="en-US" smtClean="0"/>
+              <a:rPr lang="zh-TW" altLang="en-US"/>
               <a:t>第五層</a:t>
             </a:r>
-            <a:endParaRPr lang="zh-TW" altLang="en-US"/>
           </a:p>
         </p:txBody>
       </p:sp>
@@ -1610,7 +1598,7 @@
           <a:p>
             <a:fld id="{2C22BB58-A988-46AB-A05B-B9BF694460D0}" type="datetimeFigureOut">
               <a:rPr lang="zh-TW" altLang="en-US" smtClean="0"/>
-              <a:t>2021/8/19</a:t>
+              <a:t>2021/12/18</a:t>
             </a:fld>
             <a:endParaRPr lang="zh-TW" altLang="en-US"/>
           </a:p>
@@ -1704,10 +1692,9 @@
           <a:lstStyle/>
           <a:p>
             <a:r>
-              <a:rPr lang="zh-TW" altLang="en-US" smtClean="0"/>
+              <a:rPr lang="zh-TW" altLang="en-US"/>
               <a:t>按一下以編輯母片標題樣式</a:t>
             </a:r>
-            <a:endParaRPr lang="zh-TW" altLang="en-US"/>
           </a:p>
         </p:txBody>
       </p:sp>
@@ -1728,7 +1715,7 @@
           <a:p>
             <a:fld id="{2C22BB58-A988-46AB-A05B-B9BF694460D0}" type="datetimeFigureOut">
               <a:rPr lang="zh-TW" altLang="en-US" smtClean="0"/>
-              <a:t>2021/8/19</a:t>
+              <a:t>2021/12/18</a:t>
             </a:fld>
             <a:endParaRPr lang="zh-TW" altLang="en-US"/>
           </a:p>
@@ -1823,7 +1810,7 @@
           <a:p>
             <a:fld id="{2C22BB58-A988-46AB-A05B-B9BF694460D0}" type="datetimeFigureOut">
               <a:rPr lang="zh-TW" altLang="en-US" smtClean="0"/>
-              <a:t>2021/8/19</a:t>
+              <a:t>2021/12/18</a:t>
             </a:fld>
             <a:endParaRPr lang="zh-TW" altLang="en-US"/>
           </a:p>
@@ -1926,10 +1913,9 @@
           </a:lstStyle>
           <a:p>
             <a:r>
-              <a:rPr lang="zh-TW" altLang="en-US" smtClean="0"/>
+              <a:rPr lang="zh-TW" altLang="en-US"/>
               <a:t>按一下以編輯母片標題樣式</a:t>
             </a:r>
-            <a:endParaRPr lang="zh-TW" altLang="en-US"/>
           </a:p>
         </p:txBody>
       </p:sp>
@@ -1983,38 +1969,37 @@
           <a:p>
             <a:pPr lvl="0"/>
             <a:r>
-              <a:rPr lang="zh-TW" altLang="en-US" smtClean="0"/>
+              <a:rPr lang="zh-TW" altLang="en-US"/>
               <a:t>編輯母片文字樣式</a:t>
             </a:r>
           </a:p>
           <a:p>
             <a:pPr lvl="1"/>
             <a:r>
-              <a:rPr lang="zh-TW" altLang="en-US" smtClean="0"/>
+              <a:rPr lang="zh-TW" altLang="en-US"/>
               <a:t>第二層</a:t>
             </a:r>
           </a:p>
           <a:p>
             <a:pPr lvl="2"/>
             <a:r>
-              <a:rPr lang="zh-TW" altLang="en-US" smtClean="0"/>
+              <a:rPr lang="zh-TW" altLang="en-US"/>
               <a:t>第三層</a:t>
             </a:r>
           </a:p>
           <a:p>
             <a:pPr lvl="3"/>
             <a:r>
-              <a:rPr lang="zh-TW" altLang="en-US" smtClean="0"/>
+              <a:rPr lang="zh-TW" altLang="en-US"/>
               <a:t>第四層</a:t>
             </a:r>
           </a:p>
           <a:p>
             <a:pPr lvl="4"/>
             <a:r>
-              <a:rPr lang="zh-TW" altLang="en-US" smtClean="0"/>
+              <a:rPr lang="zh-TW" altLang="en-US"/>
               <a:t>第五層</a:t>
             </a:r>
-            <a:endParaRPr lang="zh-TW" altLang="en-US"/>
           </a:p>
         </p:txBody>
       </p:sp>
@@ -2077,7 +2062,7 @@
           <a:p>
             <a:pPr lvl="0"/>
             <a:r>
-              <a:rPr lang="zh-TW" altLang="en-US" smtClean="0"/>
+              <a:rPr lang="zh-TW" altLang="en-US"/>
               <a:t>編輯母片文字樣式</a:t>
             </a:r>
           </a:p>
@@ -2100,7 +2085,7 @@
           <a:p>
             <a:fld id="{2C22BB58-A988-46AB-A05B-B9BF694460D0}" type="datetimeFigureOut">
               <a:rPr lang="zh-TW" altLang="en-US" smtClean="0"/>
-              <a:t>2021/8/19</a:t>
+              <a:t>2021/12/18</a:t>
             </a:fld>
             <a:endParaRPr lang="zh-TW" altLang="en-US"/>
           </a:p>
@@ -2203,10 +2188,9 @@
           </a:lstStyle>
           <a:p>
             <a:r>
-              <a:rPr lang="zh-TW" altLang="en-US" smtClean="0"/>
+              <a:rPr lang="zh-TW" altLang="en-US"/>
               <a:t>按一下以編輯母片標題樣式</a:t>
             </a:r>
-            <a:endParaRPr lang="zh-TW" altLang="en-US"/>
           </a:p>
         </p:txBody>
       </p:sp>
@@ -2330,7 +2314,7 @@
           <a:p>
             <a:pPr lvl="0"/>
             <a:r>
-              <a:rPr lang="zh-TW" altLang="en-US" smtClean="0"/>
+              <a:rPr lang="zh-TW" altLang="en-US"/>
               <a:t>編輯母片文字樣式</a:t>
             </a:r>
           </a:p>
@@ -2353,7 +2337,7 @@
           <a:p>
             <a:fld id="{2C22BB58-A988-46AB-A05B-B9BF694460D0}" type="datetimeFigureOut">
               <a:rPr lang="zh-TW" altLang="en-US" smtClean="0"/>
-              <a:t>2021/8/19</a:t>
+              <a:t>2021/12/18</a:t>
             </a:fld>
             <a:endParaRPr lang="zh-TW" altLang="en-US"/>
           </a:p>
@@ -2462,10 +2446,9 @@
           <a:lstStyle/>
           <a:p>
             <a:r>
-              <a:rPr lang="zh-TW" altLang="en-US" smtClean="0"/>
+              <a:rPr lang="zh-TW" altLang="en-US"/>
               <a:t>按一下以編輯母片標題樣式</a:t>
             </a:r>
-            <a:endParaRPr lang="zh-TW" altLang="en-US"/>
           </a:p>
         </p:txBody>
       </p:sp>
@@ -2496,38 +2479,37 @@
           <a:p>
             <a:pPr lvl="0"/>
             <a:r>
-              <a:rPr lang="zh-TW" altLang="en-US" smtClean="0"/>
+              <a:rPr lang="zh-TW" altLang="en-US"/>
               <a:t>編輯母片文字樣式</a:t>
             </a:r>
           </a:p>
           <a:p>
             <a:pPr lvl="1"/>
             <a:r>
-              <a:rPr lang="zh-TW" altLang="en-US" smtClean="0"/>
+              <a:rPr lang="zh-TW" altLang="en-US"/>
               <a:t>第二層</a:t>
             </a:r>
           </a:p>
           <a:p>
             <a:pPr lvl="2"/>
             <a:r>
-              <a:rPr lang="zh-TW" altLang="en-US" smtClean="0"/>
+              <a:rPr lang="zh-TW" altLang="en-US"/>
               <a:t>第三層</a:t>
             </a:r>
           </a:p>
           <a:p>
             <a:pPr lvl="3"/>
             <a:r>
-              <a:rPr lang="zh-TW" altLang="en-US" smtClean="0"/>
+              <a:rPr lang="zh-TW" altLang="en-US"/>
               <a:t>第四層</a:t>
             </a:r>
           </a:p>
           <a:p>
             <a:pPr lvl="4"/>
             <a:r>
-              <a:rPr lang="zh-TW" altLang="en-US" smtClean="0"/>
+              <a:rPr lang="zh-TW" altLang="en-US"/>
               <a:t>第五層</a:t>
             </a:r>
-            <a:endParaRPr lang="zh-TW" altLang="en-US"/>
           </a:p>
         </p:txBody>
       </p:sp>
@@ -2566,7 +2548,7 @@
           <a:p>
             <a:fld id="{2C22BB58-A988-46AB-A05B-B9BF694460D0}" type="datetimeFigureOut">
               <a:rPr lang="zh-TW" altLang="en-US" smtClean="0"/>
-              <a:t>2021/8/19</a:t>
+              <a:t>2021/12/18</a:t>
             </a:fld>
             <a:endParaRPr lang="zh-TW" altLang="en-US"/>
           </a:p>
@@ -3008,7 +2990,7 @@
           <a:p>
             <a:pPr algn="ctr"/>
             <a:r>
-              <a:rPr lang="en-US" altLang="zh-TW" dirty="0" smtClean="0"/>
+              <a:rPr lang="en-US" altLang="zh-TW" dirty="0"/>
               <a:t>Object tracker</a:t>
             </a:r>
           </a:p>
@@ -3094,10 +3076,10 @@
           <a:p>
             <a:pPr algn="ctr"/>
             <a:r>
-              <a:rPr lang="en-US" altLang="zh-TW" dirty="0" err="1" smtClean="0"/>
+              <a:rPr lang="en-US" altLang="zh-TW" dirty="0" err="1"/>
               <a:t>manipOut</a:t>
             </a:r>
-            <a:endParaRPr lang="en-US" altLang="zh-TW" dirty="0" smtClean="0"/>
+            <a:endParaRPr lang="en-US" altLang="zh-TW" dirty="0"/>
           </a:p>
         </p:txBody>
       </p:sp>
@@ -3138,10 +3120,10 @@
           <a:p>
             <a:pPr algn="ctr"/>
             <a:r>
-              <a:rPr lang="en-US" altLang="zh-TW" dirty="0" err="1" smtClean="0"/>
+              <a:rPr lang="en-US" altLang="zh-TW" dirty="0" err="1"/>
               <a:t>xinFrame</a:t>
             </a:r>
-            <a:endParaRPr lang="en-US" altLang="zh-TW" dirty="0" smtClean="0"/>
+            <a:endParaRPr lang="en-US" altLang="zh-TW" dirty="0"/>
           </a:p>
         </p:txBody>
       </p:sp>
@@ -3182,10 +3164,10 @@
           <a:p>
             <a:pPr algn="ctr"/>
             <a:r>
-              <a:rPr lang="en-US" altLang="zh-TW" dirty="0" err="1" smtClean="0"/>
+              <a:rPr lang="en-US" altLang="zh-TW" dirty="0" err="1"/>
               <a:t>xlinkout</a:t>
             </a:r>
-            <a:endParaRPr lang="en-US" altLang="zh-TW" dirty="0" smtClean="0"/>
+            <a:endParaRPr lang="en-US" altLang="zh-TW" dirty="0"/>
           </a:p>
         </p:txBody>
       </p:sp>
@@ -3226,10 +3208,10 @@
           <a:p>
             <a:pPr algn="ctr"/>
             <a:r>
-              <a:rPr lang="en-US" altLang="zh-TW" dirty="0" err="1" smtClean="0"/>
+              <a:rPr lang="en-US" altLang="zh-TW" dirty="0" err="1"/>
               <a:t>nnOut</a:t>
             </a:r>
-            <a:endParaRPr lang="en-US" altLang="zh-TW" dirty="0" smtClean="0"/>
+            <a:endParaRPr lang="en-US" altLang="zh-TW" dirty="0"/>
           </a:p>
         </p:txBody>
       </p:sp>
@@ -3270,10 +3252,10 @@
           <a:p>
             <a:pPr algn="ctr"/>
             <a:r>
-              <a:rPr lang="en-US" altLang="zh-TW" dirty="0" err="1" smtClean="0"/>
+              <a:rPr lang="en-US" altLang="zh-TW" dirty="0" err="1"/>
               <a:t>trackerOut</a:t>
             </a:r>
-            <a:endParaRPr lang="en-US" altLang="zh-TW" dirty="0" smtClean="0"/>
+            <a:endParaRPr lang="en-US" altLang="zh-TW" dirty="0"/>
           </a:p>
         </p:txBody>
       </p:sp>
@@ -3314,10 +3296,10 @@
           <a:p>
             <a:pPr algn="ctr"/>
             <a:r>
-              <a:rPr lang="en-US" altLang="zh-TW" dirty="0" err="1" smtClean="0"/>
+              <a:rPr lang="en-US" altLang="zh-TW" dirty="0" err="1"/>
               <a:t>manIP</a:t>
             </a:r>
-            <a:endParaRPr lang="en-US" altLang="zh-TW" dirty="0" smtClean="0"/>
+            <a:endParaRPr lang="en-US" altLang="zh-TW" dirty="0"/>
           </a:p>
         </p:txBody>
       </p:sp>
@@ -3646,10 +3628,10 @@
           <a:p>
             <a:pPr algn="ctr"/>
             <a:r>
-              <a:rPr lang="en-US" altLang="zh-TW" dirty="0" err="1" smtClean="0"/>
+              <a:rPr lang="en-US" altLang="zh-TW" dirty="0" err="1"/>
               <a:t>qIn</a:t>
             </a:r>
-            <a:endParaRPr lang="en-US" altLang="zh-TW" dirty="0" smtClean="0"/>
+            <a:endParaRPr lang="en-US" altLang="zh-TW" dirty="0"/>
           </a:p>
         </p:txBody>
       </p:sp>
@@ -3690,10 +3672,10 @@
           <a:p>
             <a:pPr algn="ctr"/>
             <a:r>
-              <a:rPr lang="en-US" altLang="zh-TW" dirty="0" err="1" smtClean="0"/>
+              <a:rPr lang="en-US" altLang="zh-TW" dirty="0" err="1"/>
               <a:t>qManIp</a:t>
             </a:r>
-            <a:endParaRPr lang="en-US" altLang="zh-TW" dirty="0" smtClean="0"/>
+            <a:endParaRPr lang="en-US" altLang="zh-TW" dirty="0"/>
           </a:p>
         </p:txBody>
       </p:sp>
@@ -3734,10 +3716,10 @@
           <a:p>
             <a:pPr algn="ctr"/>
             <a:r>
-              <a:rPr lang="en-US" altLang="zh-TW" dirty="0" err="1" smtClean="0"/>
+              <a:rPr lang="en-US" altLang="zh-TW" dirty="0" err="1"/>
               <a:t>TrackerFrameQ</a:t>
             </a:r>
-            <a:endParaRPr lang="en-US" altLang="zh-TW" dirty="0" smtClean="0"/>
+            <a:endParaRPr lang="en-US" altLang="zh-TW" dirty="0"/>
           </a:p>
         </p:txBody>
       </p:sp>
@@ -3778,10 +3760,10 @@
           <a:p>
             <a:pPr algn="ctr"/>
             <a:r>
-              <a:rPr lang="en-US" altLang="zh-TW" dirty="0" err="1" smtClean="0"/>
+              <a:rPr lang="en-US" altLang="zh-TW" dirty="0" err="1"/>
               <a:t>tracklets</a:t>
             </a:r>
-            <a:endParaRPr lang="en-US" altLang="zh-TW" dirty="0" smtClean="0"/>
+            <a:endParaRPr lang="en-US" altLang="zh-TW" dirty="0"/>
           </a:p>
         </p:txBody>
       </p:sp>
@@ -3822,10 +3804,10 @@
           <a:p>
             <a:pPr algn="ctr"/>
             <a:r>
-              <a:rPr lang="en-US" altLang="zh-TW" dirty="0" err="1" smtClean="0"/>
+              <a:rPr lang="en-US" altLang="zh-TW" dirty="0" err="1"/>
               <a:t>qDet</a:t>
             </a:r>
-            <a:endParaRPr lang="en-US" altLang="zh-TW" dirty="0" smtClean="0"/>
+            <a:endParaRPr lang="en-US" altLang="zh-TW" dirty="0"/>
           </a:p>
         </p:txBody>
       </p:sp>
@@ -4046,10 +4028,10 @@
           <a:p>
             <a:pPr algn="ctr"/>
             <a:r>
-              <a:rPr lang="en-US" altLang="zh-TW" dirty="0" err="1" smtClean="0"/>
+              <a:rPr lang="en-US" altLang="zh-TW" dirty="0" err="1"/>
               <a:t>manIpFrame</a:t>
             </a:r>
-            <a:endParaRPr lang="en-US" altLang="zh-TW" dirty="0" smtClean="0"/>
+            <a:endParaRPr lang="en-US" altLang="zh-TW" dirty="0"/>
           </a:p>
         </p:txBody>
       </p:sp>
@@ -4090,7 +4072,7 @@
           <a:p>
             <a:pPr algn="ctr"/>
             <a:r>
-              <a:rPr lang="en-US" altLang="zh-TW" dirty="0" smtClean="0"/>
+              <a:rPr lang="en-US" altLang="zh-TW" dirty="0"/>
               <a:t>detections</a:t>
             </a:r>
           </a:p>
@@ -4133,10 +4115,10 @@
           <a:p>
             <a:pPr algn="ctr"/>
             <a:r>
-              <a:rPr lang="en-US" altLang="zh-TW" dirty="0" err="1" smtClean="0"/>
+              <a:rPr lang="en-US" altLang="zh-TW" dirty="0" err="1"/>
               <a:t>TrackerFrame</a:t>
             </a:r>
-            <a:endParaRPr lang="en-US" altLang="zh-TW" dirty="0" smtClean="0"/>
+            <a:endParaRPr lang="en-US" altLang="zh-TW" dirty="0"/>
           </a:p>
         </p:txBody>
       </p:sp>
@@ -4177,10 +4159,10 @@
           <a:p>
             <a:pPr algn="ctr"/>
             <a:r>
-              <a:rPr lang="en-US" altLang="zh-TW" dirty="0" err="1" smtClean="0"/>
+              <a:rPr lang="en-US" altLang="zh-TW" dirty="0" err="1"/>
               <a:t>tracklets</a:t>
             </a:r>
-            <a:endParaRPr lang="en-US" altLang="zh-TW" dirty="0" smtClean="0"/>
+            <a:endParaRPr lang="en-US" altLang="zh-TW" dirty="0"/>
           </a:p>
         </p:txBody>
       </p:sp>
@@ -4293,7 +4275,7 @@
           <a:lstStyle/>
           <a:p>
             <a:r>
-              <a:rPr lang="en-US" altLang="zh-TW" dirty="0" err="1" smtClean="0"/>
+              <a:rPr lang="en-US" altLang="zh-TW" dirty="0" err="1"/>
               <a:t>colorCamera</a:t>
             </a:r>
             <a:endParaRPr lang="en-US" altLang="zh-TW" dirty="0"/>
@@ -4336,7 +4318,7 @@
           <a:lstStyle/>
           <a:p>
             <a:r>
-              <a:rPr lang="en-US" altLang="zh-TW" dirty="0" err="1" smtClean="0"/>
+              <a:rPr lang="en-US" altLang="zh-TW" dirty="0" err="1"/>
               <a:t>monoleft</a:t>
             </a:r>
             <a:endParaRPr lang="en-US" altLang="zh-TW" dirty="0"/>
@@ -4379,7 +4361,7 @@
           <a:lstStyle/>
           <a:p>
             <a:r>
-              <a:rPr lang="en-US" altLang="zh-TW" dirty="0" err="1" smtClean="0"/>
+              <a:rPr lang="en-US" altLang="zh-TW" dirty="0" err="1"/>
               <a:t>monoRight</a:t>
             </a:r>
             <a:endParaRPr lang="en-US" altLang="zh-TW" dirty="0"/>
@@ -4422,10 +4404,9 @@
           <a:lstStyle/>
           <a:p>
             <a:r>
-              <a:rPr lang="en-US" altLang="zh-TW" dirty="0" smtClean="0"/>
+              <a:rPr lang="en-US" altLang="zh-TW" dirty="0"/>
               <a:t>stereo</a:t>
             </a:r>
-            <a:endParaRPr lang="en-US" altLang="zh-TW" dirty="0"/>
           </a:p>
         </p:txBody>
       </p:sp>
@@ -4466,10 +4447,10 @@
           <a:p>
             <a:pPr algn="ctr"/>
             <a:r>
-              <a:rPr lang="en-US" altLang="zh-TW" dirty="0" err="1" smtClean="0"/>
+              <a:rPr lang="en-US" altLang="zh-TW" dirty="0" err="1"/>
               <a:t>xOutDepth</a:t>
             </a:r>
-            <a:endParaRPr lang="en-US" altLang="zh-TW" dirty="0" smtClean="0"/>
+            <a:endParaRPr lang="en-US" altLang="zh-TW" dirty="0"/>
           </a:p>
         </p:txBody>
       </p:sp>
@@ -4553,10 +4534,10 @@
           <a:p>
             <a:pPr algn="ctr"/>
             <a:r>
-              <a:rPr lang="en-US" altLang="zh-TW" dirty="0" err="1" smtClean="0"/>
+              <a:rPr lang="en-US" altLang="zh-TW" dirty="0" err="1"/>
               <a:t>xOutnn</a:t>
             </a:r>
-            <a:endParaRPr lang="en-US" altLang="zh-TW" dirty="0" smtClean="0"/>
+            <a:endParaRPr lang="en-US" altLang="zh-TW" dirty="0"/>
           </a:p>
         </p:txBody>
       </p:sp>
@@ -4597,10 +4578,10 @@
           <a:p>
             <a:pPr algn="ctr"/>
             <a:r>
-              <a:rPr lang="en-US" altLang="zh-TW" dirty="0" err="1" smtClean="0"/>
+              <a:rPr lang="en-US" altLang="zh-TW" dirty="0" err="1"/>
               <a:t>xOutRgb</a:t>
             </a:r>
-            <a:endParaRPr lang="en-US" altLang="zh-TW" dirty="0" smtClean="0"/>
+            <a:endParaRPr lang="en-US" altLang="zh-TW" dirty="0"/>
           </a:p>
         </p:txBody>
       </p:sp>
@@ -4928,10 +4909,10 @@
           <a:p>
             <a:pPr algn="ctr"/>
             <a:r>
-              <a:rPr lang="en-US" altLang="zh-TW" dirty="0" err="1" smtClean="0"/>
+              <a:rPr lang="en-US" altLang="zh-TW" dirty="0" err="1"/>
               <a:t>xoutBoundingBoxDepthMappingQueue</a:t>
             </a:r>
-            <a:endParaRPr lang="en-US" altLang="zh-TW" dirty="0" smtClean="0"/>
+            <a:endParaRPr lang="en-US" altLang="zh-TW" dirty="0"/>
           </a:p>
         </p:txBody>
       </p:sp>
@@ -4972,10 +4953,10 @@
           <a:p>
             <a:pPr algn="ctr"/>
             <a:r>
-              <a:rPr lang="en-US" altLang="zh-TW" dirty="0" err="1" smtClean="0"/>
+              <a:rPr lang="en-US" altLang="zh-TW" dirty="0" err="1"/>
               <a:t>depthQueue</a:t>
             </a:r>
-            <a:endParaRPr lang="en-US" altLang="zh-TW" dirty="0" smtClean="0"/>
+            <a:endParaRPr lang="en-US" altLang="zh-TW" dirty="0"/>
           </a:p>
         </p:txBody>
       </p:sp>
@@ -5016,10 +4997,10 @@
           <a:p>
             <a:pPr algn="ctr"/>
             <a:r>
-              <a:rPr lang="en-US" altLang="zh-TW" dirty="0" err="1" smtClean="0"/>
+              <a:rPr lang="en-US" altLang="zh-TW" dirty="0" err="1"/>
               <a:t>detectionnnQ</a:t>
             </a:r>
-            <a:endParaRPr lang="en-US" altLang="zh-TW" dirty="0" smtClean="0"/>
+            <a:endParaRPr lang="en-US" altLang="zh-TW" dirty="0"/>
           </a:p>
         </p:txBody>
       </p:sp>
@@ -5060,10 +5041,10 @@
           <a:p>
             <a:pPr algn="ctr"/>
             <a:r>
-              <a:rPr lang="en-US" altLang="zh-TW" dirty="0" err="1" smtClean="0"/>
+              <a:rPr lang="en-US" altLang="zh-TW" dirty="0" err="1"/>
               <a:t>previewQ</a:t>
             </a:r>
-            <a:endParaRPr lang="en-US" altLang="zh-TW" dirty="0" smtClean="0"/>
+            <a:endParaRPr lang="en-US" altLang="zh-TW" dirty="0"/>
           </a:p>
         </p:txBody>
       </p:sp>
@@ -5248,10 +5229,10 @@
           <a:p>
             <a:pPr algn="ctr"/>
             <a:r>
-              <a:rPr lang="en-US" altLang="zh-TW" dirty="0" err="1" smtClean="0"/>
+              <a:rPr lang="en-US" altLang="zh-TW" dirty="0" err="1"/>
               <a:t>inPreviewFrame</a:t>
             </a:r>
-            <a:endParaRPr lang="en-US" altLang="zh-TW" dirty="0" smtClean="0"/>
+            <a:endParaRPr lang="en-US" altLang="zh-TW" dirty="0"/>
           </a:p>
         </p:txBody>
       </p:sp>
@@ -5292,10 +5273,10 @@
           <a:p>
             <a:pPr algn="ctr"/>
             <a:r>
-              <a:rPr lang="en-US" altLang="zh-TW" dirty="0" err="1" smtClean="0"/>
+              <a:rPr lang="en-US" altLang="zh-TW" dirty="0" err="1"/>
               <a:t>boundingBoxMapping</a:t>
             </a:r>
-            <a:endParaRPr lang="en-US" altLang="zh-TW" dirty="0" smtClean="0"/>
+            <a:endParaRPr lang="en-US" altLang="zh-TW" dirty="0"/>
           </a:p>
         </p:txBody>
       </p:sp>
@@ -5336,7 +5317,7 @@
           <a:p>
             <a:pPr algn="ctr"/>
             <a:r>
-              <a:rPr lang="en-US" altLang="zh-TW" dirty="0" smtClean="0"/>
+              <a:rPr lang="en-US" altLang="zh-TW" dirty="0"/>
               <a:t>depth</a:t>
             </a:r>
           </a:p>
@@ -5379,10 +5360,10 @@
           <a:p>
             <a:pPr algn="ctr"/>
             <a:r>
-              <a:rPr lang="en-US" altLang="zh-TW" dirty="0" err="1" smtClean="0"/>
+              <a:rPr lang="en-US" altLang="zh-TW" dirty="0" err="1"/>
               <a:t>inDet</a:t>
             </a:r>
-            <a:endParaRPr lang="en-US" altLang="zh-TW" dirty="0" smtClean="0"/>
+            <a:endParaRPr lang="en-US" altLang="zh-TW" dirty="0"/>
           </a:p>
         </p:txBody>
       </p:sp>
@@ -5452,7 +5433,7 @@
           <a:lstStyle/>
           <a:p>
             <a:r>
-              <a:rPr lang="en-US" altLang="zh-TW" dirty="0" err="1" smtClean="0"/>
+              <a:rPr lang="en-US" altLang="zh-TW" dirty="0" err="1"/>
               <a:t>colorCamera</a:t>
             </a:r>
             <a:endParaRPr lang="en-US" altLang="zh-TW" dirty="0"/>
@@ -5495,14 +5476,14 @@
           <a:lstStyle/>
           <a:p>
             <a:r>
-              <a:rPr lang="en-US" altLang="zh-TW" dirty="0" smtClean="0"/>
+              <a:rPr lang="en-US" altLang="zh-TW" dirty="0"/>
               <a:t>Face </a:t>
             </a:r>
             <a:r>
-              <a:rPr lang="en-US" altLang="zh-TW" dirty="0" err="1" smtClean="0"/>
+              <a:rPr lang="en-US" altLang="zh-TW" dirty="0" err="1"/>
               <a:t>nn</a:t>
             </a:r>
-            <a:endParaRPr lang="en-US" altLang="zh-TW" dirty="0" smtClean="0"/>
+            <a:endParaRPr lang="en-US" altLang="zh-TW" dirty="0"/>
           </a:p>
         </p:txBody>
       </p:sp>
@@ -5542,10 +5523,10 @@
           <a:lstStyle/>
           <a:p>
             <a:r>
-              <a:rPr lang="en-US" altLang="zh-TW" dirty="0" err="1" smtClean="0"/>
+              <a:rPr lang="en-US" altLang="zh-TW" dirty="0" err="1"/>
               <a:t>Land_nn</a:t>
             </a:r>
-            <a:endParaRPr lang="en-US" altLang="zh-TW" dirty="0" smtClean="0"/>
+            <a:endParaRPr lang="en-US" altLang="zh-TW" dirty="0"/>
           </a:p>
         </p:txBody>
       </p:sp>
@@ -5622,14 +5603,10 @@
           <a:p>
             <a:pPr algn="ctr"/>
             <a:r>
-              <a:rPr lang="en-US" altLang="zh-TW" dirty="0" err="1" smtClean="0"/>
-              <a:t>Face</a:t>
-            </a:r>
-            <a:r>
-              <a:rPr lang="en-US" altLang="zh-TW" dirty="0" err="1" smtClean="0"/>
-              <a:t>Outnn</a:t>
-            </a:r>
-            <a:endParaRPr lang="en-US" altLang="zh-TW" dirty="0" smtClean="0"/>
+              <a:rPr lang="en-US" altLang="zh-TW" dirty="0" err="1"/>
+              <a:t>FaceOutnn</a:t>
+            </a:r>
+            <a:endParaRPr lang="en-US" altLang="zh-TW" dirty="0"/>
           </a:p>
         </p:txBody>
       </p:sp>
@@ -5706,14 +5683,10 @@
           <a:p>
             <a:pPr algn="ctr"/>
             <a:r>
-              <a:rPr lang="en-US" altLang="zh-TW" dirty="0" err="1" smtClean="0"/>
-              <a:t>Land</a:t>
-            </a:r>
-            <a:r>
-              <a:rPr lang="en-US" altLang="zh-TW" dirty="0" err="1" smtClean="0"/>
-              <a:t>Outnn</a:t>
-            </a:r>
-            <a:endParaRPr lang="en-US" altLang="zh-TW" dirty="0" smtClean="0"/>
+              <a:rPr lang="en-US" altLang="zh-TW" dirty="0" err="1"/>
+              <a:t>LandOutnn</a:t>
+            </a:r>
+            <a:endParaRPr lang="en-US" altLang="zh-TW" dirty="0"/>
           </a:p>
         </p:txBody>
       </p:sp>
@@ -5789,7 +5762,7 @@
           <a:lstStyle/>
           <a:p>
             <a:r>
-              <a:rPr lang="en-US" altLang="zh-TW" dirty="0" err="1" smtClean="0"/>
+              <a:rPr lang="en-US" altLang="zh-TW" dirty="0" err="1"/>
               <a:t>Land_in</a:t>
             </a:r>
             <a:endParaRPr lang="en-US" altLang="zh-TW" dirty="0"/>
@@ -5869,10 +5842,10 @@
           <a:p>
             <a:pPr algn="ctr"/>
             <a:r>
-              <a:rPr lang="en-US" altLang="zh-TW" dirty="0" err="1" smtClean="0"/>
+              <a:rPr lang="en-US" altLang="zh-TW" dirty="0" err="1"/>
               <a:t>CamOut</a:t>
             </a:r>
-            <a:endParaRPr lang="en-US" altLang="zh-TW" dirty="0" smtClean="0"/>
+            <a:endParaRPr lang="en-US" altLang="zh-TW" dirty="0"/>
           </a:p>
         </p:txBody>
       </p:sp>
@@ -5949,10 +5922,10 @@
           <a:p>
             <a:pPr algn="ctr"/>
             <a:r>
-              <a:rPr lang="en-US" altLang="zh-TW" dirty="0" err="1" smtClean="0"/>
+              <a:rPr lang="en-US" altLang="zh-TW" dirty="0" err="1"/>
               <a:t>camoutQ</a:t>
             </a:r>
-            <a:endParaRPr lang="en-US" altLang="zh-TW" dirty="0" smtClean="0"/>
+            <a:endParaRPr lang="en-US" altLang="zh-TW" dirty="0"/>
           </a:p>
         </p:txBody>
       </p:sp>
@@ -5993,10 +5966,10 @@
           <a:p>
             <a:pPr algn="ctr"/>
             <a:r>
-              <a:rPr lang="en-US" altLang="zh-TW" dirty="0" err="1" smtClean="0"/>
+              <a:rPr lang="en-US" altLang="zh-TW" dirty="0" err="1"/>
               <a:t>Face_nnQ</a:t>
             </a:r>
-            <a:endParaRPr lang="en-US" altLang="zh-TW" dirty="0" smtClean="0"/>
+            <a:endParaRPr lang="en-US" altLang="zh-TW" dirty="0"/>
           </a:p>
         </p:txBody>
       </p:sp>
@@ -6037,10 +6010,9 @@
           <a:p>
             <a:pPr algn="ctr"/>
             <a:r>
-              <a:rPr lang="en-US" altLang="zh-TW" dirty="0" smtClean="0"/>
+              <a:rPr lang="en-US" altLang="zh-TW" dirty="0"/>
               <a:t>land68_nnQ</a:t>
             </a:r>
-            <a:endParaRPr lang="en-US" altLang="zh-TW" dirty="0" smtClean="0"/>
           </a:p>
         </p:txBody>
       </p:sp>
@@ -6081,10 +6053,9 @@
           <a:p>
             <a:pPr algn="ctr"/>
             <a:r>
-              <a:rPr lang="en-US" altLang="zh-TW" dirty="0" smtClean="0"/>
+              <a:rPr lang="en-US" altLang="zh-TW" dirty="0"/>
               <a:t>land68_inQ</a:t>
             </a:r>
-            <a:endParaRPr lang="en-US" altLang="zh-TW" dirty="0" smtClean="0"/>
           </a:p>
         </p:txBody>
       </p:sp>
@@ -6092,6 +6063,623 @@
     <p:extLst>
       <p:ext uri="{BB962C8B-B14F-4D97-AF65-F5344CB8AC3E}">
         <p14:creationId xmlns:p14="http://schemas.microsoft.com/office/powerpoint/2010/main" val="1832435131"/>
+      </p:ext>
+    </p:extLst>
+  </p:cSld>
+  <p:clrMapOvr>
+    <a:masterClrMapping/>
+  </p:clrMapOvr>
+</p:sld>
+</file>
+
+<file path=ppt/slides/slide4.xml><?xml version="1.0" encoding="utf-8"?>
+<p:sld xmlns:a="http://schemas.openxmlformats.org/drawingml/2006/main" xmlns:r="http://schemas.openxmlformats.org/officeDocument/2006/relationships" xmlns:p="http://schemas.openxmlformats.org/presentationml/2006/main">
+  <p:cSld>
+    <p:spTree>
+      <p:nvGrpSpPr>
+        <p:cNvPr id="1" name=""/>
+        <p:cNvGrpSpPr/>
+        <p:nvPr/>
+      </p:nvGrpSpPr>
+      <p:grpSpPr>
+        <a:xfrm>
+          <a:off x="0" y="0"/>
+          <a:ext cx="0" cy="0"/>
+          <a:chOff x="0" y="0"/>
+          <a:chExt cx="0" cy="0"/>
+        </a:xfrm>
+      </p:grpSpPr>
+      <p:sp>
+        <p:nvSpPr>
+          <p:cNvPr id="2" name="標題 1">
+            <a:extLst>
+              <a:ext uri="{FF2B5EF4-FFF2-40B4-BE49-F238E27FC236}">
+                <a16:creationId xmlns:a16="http://schemas.microsoft.com/office/drawing/2014/main" id="{7F9F77CE-E378-4790-92A9-A249E4FDA93A}"/>
+              </a:ext>
+            </a:extLst>
+          </p:cNvPr>
+          <p:cNvSpPr>
+            <a:spLocks noGrp="1"/>
+          </p:cNvSpPr>
+          <p:nvPr>
+            <p:ph type="title"/>
+          </p:nvPr>
+        </p:nvSpPr>
+        <p:spPr/>
+        <p:txBody>
+          <a:bodyPr/>
+          <a:lstStyle/>
+          <a:p>
+            <a:r>
+              <a:rPr lang="en-US" altLang="zh-TW" dirty="0" err="1"/>
+              <a:t>CombinedCam</a:t>
+            </a:r>
+            <a:endParaRPr lang="zh-TW" altLang="en-US" dirty="0"/>
+          </a:p>
+        </p:txBody>
+      </p:sp>
+      <p:sp>
+        <p:nvSpPr>
+          <p:cNvPr id="3" name="文字版面配置區 2">
+            <a:extLst>
+              <a:ext uri="{FF2B5EF4-FFF2-40B4-BE49-F238E27FC236}">
+                <a16:creationId xmlns:a16="http://schemas.microsoft.com/office/drawing/2014/main" id="{62BFB121-1E03-4160-B756-9FF85F38C0EF}"/>
+              </a:ext>
+            </a:extLst>
+          </p:cNvPr>
+          <p:cNvSpPr>
+            <a:spLocks noGrp="1"/>
+          </p:cNvSpPr>
+          <p:nvPr>
+            <p:ph type="body" idx="1"/>
+          </p:nvPr>
+        </p:nvSpPr>
+        <p:spPr/>
+        <p:txBody>
+          <a:bodyPr/>
+          <a:lstStyle/>
+          <a:p>
+            <a:endParaRPr lang="zh-TW" altLang="en-US"/>
+          </a:p>
+        </p:txBody>
+      </p:sp>
+    </p:spTree>
+    <p:extLst>
+      <p:ext uri="{BB962C8B-B14F-4D97-AF65-F5344CB8AC3E}">
+        <p14:creationId xmlns:p14="http://schemas.microsoft.com/office/powerpoint/2010/main" val="119336966"/>
+      </p:ext>
+    </p:extLst>
+  </p:cSld>
+  <p:clrMapOvr>
+    <a:masterClrMapping/>
+  </p:clrMapOvr>
+</p:sld>
+</file>
+
+<file path=ppt/slides/slide5.xml><?xml version="1.0" encoding="utf-8"?>
+<p:sld xmlns:a="http://schemas.openxmlformats.org/drawingml/2006/main" xmlns:r="http://schemas.openxmlformats.org/officeDocument/2006/relationships" xmlns:p="http://schemas.openxmlformats.org/presentationml/2006/main">
+  <p:cSld>
+    <p:spTree>
+      <p:nvGrpSpPr>
+        <p:cNvPr id="1" name=""/>
+        <p:cNvGrpSpPr/>
+        <p:nvPr/>
+      </p:nvGrpSpPr>
+      <p:grpSpPr>
+        <a:xfrm>
+          <a:off x="0" y="0"/>
+          <a:ext cx="0" cy="0"/>
+          <a:chOff x="0" y="0"/>
+          <a:chExt cx="0" cy="0"/>
+        </a:xfrm>
+      </p:grpSpPr>
+      <p:sp>
+        <p:nvSpPr>
+          <p:cNvPr id="2" name="橢圓 1">
+            <a:extLst>
+              <a:ext uri="{FF2B5EF4-FFF2-40B4-BE49-F238E27FC236}">
+                <a16:creationId xmlns:a16="http://schemas.microsoft.com/office/drawing/2014/main" id="{35F62DEB-CB52-45C5-A235-48F5C1642DBD}"/>
+              </a:ext>
+            </a:extLst>
+          </p:cNvPr>
+          <p:cNvSpPr/>
+          <p:nvPr/>
+        </p:nvSpPr>
+        <p:spPr>
+          <a:xfrm>
+            <a:off x="0" y="442346"/>
+            <a:ext cx="2013358" cy="648223"/>
+          </a:xfrm>
+          <a:prstGeom prst="ellipse">
+            <a:avLst/>
+          </a:prstGeom>
+        </p:spPr>
+        <p:style>
+          <a:lnRef idx="2">
+            <a:schemeClr val="accent1">
+              <a:shade val="50000"/>
+            </a:schemeClr>
+          </a:lnRef>
+          <a:fillRef idx="1">
+            <a:schemeClr val="accent1"/>
+          </a:fillRef>
+          <a:effectRef idx="0">
+            <a:schemeClr val="accent1"/>
+          </a:effectRef>
+          <a:fontRef idx="minor">
+            <a:schemeClr val="lt1"/>
+          </a:fontRef>
+        </p:style>
+        <p:txBody>
+          <a:bodyPr rtlCol="0" anchor="ctr"/>
+          <a:lstStyle/>
+          <a:p>
+            <a:r>
+              <a:rPr lang="en-US" altLang="zh-TW" dirty="0" err="1"/>
+              <a:t>colorCamera</a:t>
+            </a:r>
+            <a:endParaRPr lang="en-US" altLang="zh-TW" dirty="0"/>
+          </a:p>
+        </p:txBody>
+      </p:sp>
+      <p:sp>
+        <p:nvSpPr>
+          <p:cNvPr id="3" name="矩形 2">
+            <a:extLst>
+              <a:ext uri="{FF2B5EF4-FFF2-40B4-BE49-F238E27FC236}">
+                <a16:creationId xmlns:a16="http://schemas.microsoft.com/office/drawing/2014/main" id="{3B211926-A03E-4F78-8787-1320EA5B4437}"/>
+              </a:ext>
+            </a:extLst>
+          </p:cNvPr>
+          <p:cNvSpPr/>
+          <p:nvPr/>
+        </p:nvSpPr>
+        <p:spPr>
+          <a:xfrm>
+            <a:off x="4685871" y="1483876"/>
+            <a:ext cx="1936865" cy="1130531"/>
+          </a:xfrm>
+          <a:prstGeom prst="rect">
+            <a:avLst/>
+          </a:prstGeom>
+        </p:spPr>
+        <p:style>
+          <a:lnRef idx="2">
+            <a:schemeClr val="accent1">
+              <a:shade val="50000"/>
+            </a:schemeClr>
+          </a:lnRef>
+          <a:fillRef idx="1">
+            <a:schemeClr val="accent1"/>
+          </a:fillRef>
+          <a:effectRef idx="0">
+            <a:schemeClr val="accent1"/>
+          </a:effectRef>
+          <a:fontRef idx="minor">
+            <a:schemeClr val="lt1"/>
+          </a:fontRef>
+        </p:style>
+        <p:txBody>
+          <a:bodyPr rtlCol="0" anchor="ctr"/>
+          <a:lstStyle/>
+          <a:p>
+            <a:pPr algn="ctr"/>
+            <a:r>
+              <a:rPr lang="en-US" altLang="zh-TW" dirty="0" err="1"/>
+              <a:t>Cam_out</a:t>
+            </a:r>
+            <a:endParaRPr lang="en-US" altLang="zh-TW" dirty="0"/>
+          </a:p>
+        </p:txBody>
+      </p:sp>
+      <p:sp>
+        <p:nvSpPr>
+          <p:cNvPr id="5" name="矩形 4">
+            <a:extLst>
+              <a:ext uri="{FF2B5EF4-FFF2-40B4-BE49-F238E27FC236}">
+                <a16:creationId xmlns:a16="http://schemas.microsoft.com/office/drawing/2014/main" id="{F1C42701-1D78-4297-B391-6600FCC8E572}"/>
+              </a:ext>
+            </a:extLst>
+          </p:cNvPr>
+          <p:cNvSpPr/>
+          <p:nvPr/>
+        </p:nvSpPr>
+        <p:spPr>
+          <a:xfrm>
+            <a:off x="4392257" y="201191"/>
+            <a:ext cx="1936865" cy="1130531"/>
+          </a:xfrm>
+          <a:prstGeom prst="rect">
+            <a:avLst/>
+          </a:prstGeom>
+        </p:spPr>
+        <p:style>
+          <a:lnRef idx="2">
+            <a:schemeClr val="accent6">
+              <a:shade val="50000"/>
+            </a:schemeClr>
+          </a:lnRef>
+          <a:fillRef idx="1">
+            <a:schemeClr val="accent6"/>
+          </a:fillRef>
+          <a:effectRef idx="0">
+            <a:schemeClr val="accent6"/>
+          </a:effectRef>
+          <a:fontRef idx="minor">
+            <a:schemeClr val="lt1"/>
+          </a:fontRef>
+        </p:style>
+        <p:txBody>
+          <a:bodyPr rtlCol="0" anchor="ctr"/>
+          <a:lstStyle/>
+          <a:p>
+            <a:pPr algn="ctr"/>
+            <a:r>
+              <a:rPr lang="en-US" altLang="zh-TW" dirty="0"/>
+              <a:t>(</a:t>
+            </a:r>
+            <a:r>
+              <a:rPr lang="en-US" altLang="zh-TW" dirty="0" err="1"/>
+              <a:t>Xlinkout</a:t>
+            </a:r>
+            <a:r>
+              <a:rPr lang="en-US" altLang="zh-TW" dirty="0"/>
+              <a:t>)</a:t>
+            </a:r>
+          </a:p>
+        </p:txBody>
+      </p:sp>
+      <p:sp>
+        <p:nvSpPr>
+          <p:cNvPr id="6" name="矩形 5">
+            <a:extLst>
+              <a:ext uri="{FF2B5EF4-FFF2-40B4-BE49-F238E27FC236}">
+                <a16:creationId xmlns:a16="http://schemas.microsoft.com/office/drawing/2014/main" id="{6284F4E7-C2D9-4663-9725-9199CE038B85}"/>
+              </a:ext>
+            </a:extLst>
+          </p:cNvPr>
+          <p:cNvSpPr/>
+          <p:nvPr/>
+        </p:nvSpPr>
+        <p:spPr>
+          <a:xfrm>
+            <a:off x="4685872" y="2766562"/>
+            <a:ext cx="1936865" cy="1130531"/>
+          </a:xfrm>
+          <a:prstGeom prst="rect">
+            <a:avLst/>
+          </a:prstGeom>
+        </p:spPr>
+        <p:style>
+          <a:lnRef idx="2">
+            <a:schemeClr val="accent1">
+              <a:shade val="50000"/>
+            </a:schemeClr>
+          </a:lnRef>
+          <a:fillRef idx="1">
+            <a:schemeClr val="accent1"/>
+          </a:fillRef>
+          <a:effectRef idx="0">
+            <a:schemeClr val="accent1"/>
+          </a:effectRef>
+          <a:fontRef idx="minor">
+            <a:schemeClr val="lt1"/>
+          </a:fontRef>
+        </p:style>
+        <p:txBody>
+          <a:bodyPr rtlCol="0" anchor="ctr"/>
+          <a:lstStyle/>
+          <a:p>
+            <a:pPr algn="ctr"/>
+            <a:r>
+              <a:rPr lang="en-US" altLang="zh-TW" dirty="0" err="1"/>
+              <a:t>Yolox_det_nn</a:t>
+            </a:r>
+            <a:endParaRPr lang="en-US" altLang="zh-TW" dirty="0"/>
+          </a:p>
+        </p:txBody>
+      </p:sp>
+      <p:sp>
+        <p:nvSpPr>
+          <p:cNvPr id="7" name="橢圓 6">
+            <a:extLst>
+              <a:ext uri="{FF2B5EF4-FFF2-40B4-BE49-F238E27FC236}">
+                <a16:creationId xmlns:a16="http://schemas.microsoft.com/office/drawing/2014/main" id="{BF77A7EB-6496-4CD0-99F2-7DC05695AC03}"/>
+              </a:ext>
+            </a:extLst>
+          </p:cNvPr>
+          <p:cNvSpPr/>
+          <p:nvPr/>
+        </p:nvSpPr>
+        <p:spPr>
+          <a:xfrm>
+            <a:off x="1526797" y="3861440"/>
+            <a:ext cx="2013358" cy="648223"/>
+          </a:xfrm>
+          <a:prstGeom prst="ellipse">
+            <a:avLst/>
+          </a:prstGeom>
+        </p:spPr>
+        <p:style>
+          <a:lnRef idx="2">
+            <a:schemeClr val="accent1">
+              <a:shade val="50000"/>
+            </a:schemeClr>
+          </a:lnRef>
+          <a:fillRef idx="1">
+            <a:schemeClr val="accent1"/>
+          </a:fillRef>
+          <a:effectRef idx="0">
+            <a:schemeClr val="accent1"/>
+          </a:effectRef>
+          <a:fontRef idx="minor">
+            <a:schemeClr val="lt1"/>
+          </a:fontRef>
+        </p:style>
+        <p:txBody>
+          <a:bodyPr rtlCol="0" anchor="ctr"/>
+          <a:lstStyle/>
+          <a:p>
+            <a:r>
+              <a:rPr lang="en-US" altLang="zh-TW" dirty="0" err="1"/>
+              <a:t>yoloDet</a:t>
+            </a:r>
+            <a:endParaRPr lang="en-US" altLang="zh-TW" dirty="0"/>
+          </a:p>
+        </p:txBody>
+      </p:sp>
+      <p:sp>
+        <p:nvSpPr>
+          <p:cNvPr id="8" name="橢圓 7">
+            <a:extLst>
+              <a:ext uri="{FF2B5EF4-FFF2-40B4-BE49-F238E27FC236}">
+                <a16:creationId xmlns:a16="http://schemas.microsoft.com/office/drawing/2014/main" id="{2A648EE8-AE09-4C4A-A575-55D92E423051}"/>
+              </a:ext>
+            </a:extLst>
+          </p:cNvPr>
+          <p:cNvSpPr/>
+          <p:nvPr/>
+        </p:nvSpPr>
+        <p:spPr>
+          <a:xfrm>
+            <a:off x="325394" y="4636655"/>
+            <a:ext cx="1562792" cy="1346662"/>
+          </a:xfrm>
+          <a:prstGeom prst="ellipse">
+            <a:avLst/>
+          </a:prstGeom>
+        </p:spPr>
+        <p:style>
+          <a:lnRef idx="2">
+            <a:schemeClr val="accent1">
+              <a:shade val="50000"/>
+            </a:schemeClr>
+          </a:lnRef>
+          <a:fillRef idx="1">
+            <a:schemeClr val="accent1"/>
+          </a:fillRef>
+          <a:effectRef idx="0">
+            <a:schemeClr val="accent1"/>
+          </a:effectRef>
+          <a:fontRef idx="minor">
+            <a:schemeClr val="lt1"/>
+          </a:fontRef>
+        </p:style>
+        <p:txBody>
+          <a:bodyPr rtlCol="0" anchor="ctr"/>
+          <a:lstStyle/>
+          <a:p>
+            <a:pPr algn="ctr"/>
+            <a:r>
+              <a:rPr lang="en-US" altLang="zh-TW" dirty="0" err="1"/>
+              <a:t>manIP</a:t>
+            </a:r>
+            <a:endParaRPr lang="en-US" altLang="zh-TW" dirty="0"/>
+          </a:p>
+        </p:txBody>
+      </p:sp>
+      <p:cxnSp>
+        <p:nvCxnSpPr>
+          <p:cNvPr id="10" name="直線單箭頭接點 9">
+            <a:extLst>
+              <a:ext uri="{FF2B5EF4-FFF2-40B4-BE49-F238E27FC236}">
+                <a16:creationId xmlns:a16="http://schemas.microsoft.com/office/drawing/2014/main" id="{40FF27FD-EA24-41C5-82EF-DB5F3E2A1111}"/>
+              </a:ext>
+            </a:extLst>
+          </p:cNvPr>
+          <p:cNvCxnSpPr>
+            <a:stCxn id="2" idx="4"/>
+            <a:endCxn id="8" idx="0"/>
+          </p:cNvCxnSpPr>
+          <p:nvPr/>
+        </p:nvCxnSpPr>
+        <p:spPr>
+          <a:xfrm>
+            <a:off x="1006679" y="1090569"/>
+            <a:ext cx="100111" cy="3546086"/>
+          </a:xfrm>
+          <a:prstGeom prst="straightConnector1">
+            <a:avLst/>
+          </a:prstGeom>
+          <a:ln>
+            <a:tailEnd type="triangle"/>
+          </a:ln>
+        </p:spPr>
+        <p:style>
+          <a:lnRef idx="1">
+            <a:schemeClr val="accent1"/>
+          </a:lnRef>
+          <a:fillRef idx="0">
+            <a:schemeClr val="accent1"/>
+          </a:fillRef>
+          <a:effectRef idx="0">
+            <a:schemeClr val="accent1"/>
+          </a:effectRef>
+          <a:fontRef idx="minor">
+            <a:schemeClr val="tx1"/>
+          </a:fontRef>
+        </p:style>
+      </p:cxnSp>
+      <p:cxnSp>
+        <p:nvCxnSpPr>
+          <p:cNvPr id="12" name="直線單箭頭接點 11">
+            <a:extLst>
+              <a:ext uri="{FF2B5EF4-FFF2-40B4-BE49-F238E27FC236}">
+                <a16:creationId xmlns:a16="http://schemas.microsoft.com/office/drawing/2014/main" id="{B2E2197E-3EC2-4665-A901-CB40C2025DEE}"/>
+              </a:ext>
+            </a:extLst>
+          </p:cNvPr>
+          <p:cNvCxnSpPr>
+            <a:stCxn id="8" idx="6"/>
+            <a:endCxn id="7" idx="4"/>
+          </p:cNvCxnSpPr>
+          <p:nvPr/>
+        </p:nvCxnSpPr>
+        <p:spPr>
+          <a:xfrm flipV="1">
+            <a:off x="1888186" y="4509663"/>
+            <a:ext cx="645290" cy="800323"/>
+          </a:xfrm>
+          <a:prstGeom prst="straightConnector1">
+            <a:avLst/>
+          </a:prstGeom>
+          <a:ln>
+            <a:tailEnd type="triangle"/>
+          </a:ln>
+        </p:spPr>
+        <p:style>
+          <a:lnRef idx="1">
+            <a:schemeClr val="accent1"/>
+          </a:lnRef>
+          <a:fillRef idx="0">
+            <a:schemeClr val="accent1"/>
+          </a:fillRef>
+          <a:effectRef idx="0">
+            <a:schemeClr val="accent1"/>
+          </a:effectRef>
+          <a:fontRef idx="minor">
+            <a:schemeClr val="tx1"/>
+          </a:fontRef>
+        </p:style>
+      </p:cxnSp>
+      <p:cxnSp>
+        <p:nvCxnSpPr>
+          <p:cNvPr id="15" name="直線單箭頭接點 14">
+            <a:extLst>
+              <a:ext uri="{FF2B5EF4-FFF2-40B4-BE49-F238E27FC236}">
+                <a16:creationId xmlns:a16="http://schemas.microsoft.com/office/drawing/2014/main" id="{C3B6413F-B73B-4E06-8B07-D2DB15150511}"/>
+              </a:ext>
+            </a:extLst>
+          </p:cNvPr>
+          <p:cNvCxnSpPr>
+            <a:stCxn id="7" idx="6"/>
+            <a:endCxn id="6" idx="1"/>
+          </p:cNvCxnSpPr>
+          <p:nvPr/>
+        </p:nvCxnSpPr>
+        <p:spPr>
+          <a:xfrm flipV="1">
+            <a:off x="3540155" y="3331828"/>
+            <a:ext cx="1145717" cy="853724"/>
+          </a:xfrm>
+          <a:prstGeom prst="straightConnector1">
+            <a:avLst/>
+          </a:prstGeom>
+          <a:ln>
+            <a:tailEnd type="triangle"/>
+          </a:ln>
+        </p:spPr>
+        <p:style>
+          <a:lnRef idx="1">
+            <a:schemeClr val="accent1"/>
+          </a:lnRef>
+          <a:fillRef idx="0">
+            <a:schemeClr val="accent1"/>
+          </a:fillRef>
+          <a:effectRef idx="0">
+            <a:schemeClr val="accent1"/>
+          </a:effectRef>
+          <a:fontRef idx="minor">
+            <a:schemeClr val="tx1"/>
+          </a:fontRef>
+        </p:style>
+      </p:cxnSp>
+      <p:cxnSp>
+        <p:nvCxnSpPr>
+          <p:cNvPr id="17" name="直線單箭頭接點 16">
+            <a:extLst>
+              <a:ext uri="{FF2B5EF4-FFF2-40B4-BE49-F238E27FC236}">
+                <a16:creationId xmlns:a16="http://schemas.microsoft.com/office/drawing/2014/main" id="{EB9FAA15-304B-4385-AC1B-AD096D9BB15A}"/>
+              </a:ext>
+            </a:extLst>
+          </p:cNvPr>
+          <p:cNvCxnSpPr>
+            <a:stCxn id="2" idx="6"/>
+            <a:endCxn id="3" idx="1"/>
+          </p:cNvCxnSpPr>
+          <p:nvPr/>
+        </p:nvCxnSpPr>
+        <p:spPr>
+          <a:xfrm>
+            <a:off x="2013358" y="766458"/>
+            <a:ext cx="2672513" cy="1282684"/>
+          </a:xfrm>
+          <a:prstGeom prst="straightConnector1">
+            <a:avLst/>
+          </a:prstGeom>
+          <a:ln>
+            <a:tailEnd type="triangle"/>
+          </a:ln>
+        </p:spPr>
+        <p:style>
+          <a:lnRef idx="1">
+            <a:schemeClr val="accent1"/>
+          </a:lnRef>
+          <a:fillRef idx="0">
+            <a:schemeClr val="accent1"/>
+          </a:fillRef>
+          <a:effectRef idx="0">
+            <a:schemeClr val="accent1"/>
+          </a:effectRef>
+          <a:fontRef idx="minor">
+            <a:schemeClr val="tx1"/>
+          </a:fontRef>
+        </p:style>
+      </p:cxnSp>
+    </p:spTree>
+    <p:extLst>
+      <p:ext uri="{BB962C8B-B14F-4D97-AF65-F5344CB8AC3E}">
+        <p14:creationId xmlns:p14="http://schemas.microsoft.com/office/powerpoint/2010/main" val="2718458137"/>
+      </p:ext>
+    </p:extLst>
+  </p:cSld>
+  <p:clrMapOvr>
+    <a:masterClrMapping/>
+  </p:clrMapOvr>
+</p:sld>
+</file>
+
+<file path=ppt/slides/slide6.xml><?xml version="1.0" encoding="utf-8"?>
+<p:sld xmlns:a="http://schemas.openxmlformats.org/drawingml/2006/main" xmlns:r="http://schemas.openxmlformats.org/officeDocument/2006/relationships" xmlns:p="http://schemas.openxmlformats.org/presentationml/2006/main">
+  <p:cSld>
+    <p:spTree>
+      <p:nvGrpSpPr>
+        <p:cNvPr id="1" name=""/>
+        <p:cNvGrpSpPr/>
+        <p:nvPr/>
+      </p:nvGrpSpPr>
+      <p:grpSpPr>
+        <a:xfrm>
+          <a:off x="0" y="0"/>
+          <a:ext cx="0" cy="0"/>
+          <a:chOff x="0" y="0"/>
+          <a:chExt cx="0" cy="0"/>
+        </a:xfrm>
+      </p:grpSpPr>
+    </p:spTree>
+    <p:extLst>
+      <p:ext uri="{BB962C8B-B14F-4D97-AF65-F5344CB8AC3E}">
+        <p14:creationId xmlns:p14="http://schemas.microsoft.com/office/powerpoint/2010/main" val="1880108989"/>
       </p:ext>
     </p:extLst>
   </p:cSld>

</xml_diff>